<commit_message>
Added Lab 5 and Project
</commit_message>
<xml_diff>
--- a/Lab 3/Lab 3 - Introduction to the C programming Language.pptx
+++ b/Lab 3/Lab 3 - Introduction to the C programming Language.pptx
@@ -296,7 +296,7 @@
           <a:p>
             <a:fld id="{1D8BD707-D9CF-40AE-B4C6-C98DA3205C09}" type="datetimeFigureOut">
               <a:rPr lang="en-US"/>
-              <a:t>29-Sep-22</a:t>
+              <a:t>03-Oct-22</a:t>
             </a:fld>
             <a:endParaRPr lang="en-US"/>
           </a:p>
@@ -473,7 +473,7 @@
           <a:p>
             <a:fld id="{1D8BD707-D9CF-40AE-B4C6-C98DA3205C09}" type="datetimeFigureOut">
               <a:rPr lang="en-US"/>
-              <a:t>29-Sep-22</a:t>
+              <a:t>03-Oct-22</a:t>
             </a:fld>
             <a:endParaRPr lang="en-US"/>
           </a:p>
@@ -687,7 +687,7 @@
           <a:p>
             <a:fld id="{1D8BD707-D9CF-40AE-B4C6-C98DA3205C09}" type="datetimeFigureOut">
               <a:rPr lang="en-US"/>
-              <a:t>29-Sep-22</a:t>
+              <a:t>03-Oct-22</a:t>
             </a:fld>
             <a:endParaRPr lang="en-US"/>
           </a:p>
@@ -835,7 +835,7 @@
           <a:p>
             <a:fld id="{1D8BD707-D9CF-40AE-B4C6-C98DA3205C09}" type="datetimeFigureOut">
               <a:rPr lang="en-US"/>
-              <a:t>29-Sep-22</a:t>
+              <a:t>03-Oct-22</a:t>
             </a:fld>
             <a:endParaRPr lang="en-US"/>
           </a:p>
@@ -954,7 +954,7 @@
           <a:p>
             <a:fld id="{1D8BD707-D9CF-40AE-B4C6-C98DA3205C09}" type="datetimeFigureOut">
               <a:rPr lang="en-US"/>
-              <a:t>29-Sep-22</a:t>
+              <a:t>03-Oct-22</a:t>
             </a:fld>
             <a:endParaRPr lang="en-US"/>
           </a:p>
@@ -1179,7 +1179,7 @@
           <a:p>
             <a:fld id="{1D8BD707-D9CF-40AE-B4C6-C98DA3205C09}" type="datetimeFigureOut">
               <a:rPr lang="en-US"/>
-              <a:t>29-Sep-22</a:t>
+              <a:t>03-Oct-22</a:t>
             </a:fld>
             <a:endParaRPr lang="en-US"/>
           </a:p>
@@ -4139,7 +4139,7 @@
                 <a:latin typeface="Times New Roman" panose="02020603050405020304" pitchFamily="18" charset="0"/>
                 <a:cs typeface="Times New Roman" panose="02020603050405020304" pitchFamily="18" charset="0"/>
               </a:rPr>
-              <a:t>be  using</a:t>
+              <a:t>be using</a:t>
             </a:r>
             <a:r>
               <a:rPr lang="en-US" sz="2400" dirty="0">
@@ -10344,28 +10344,34 @@
               <a:t>rogrammer should </a:t>
             </a:r>
             <a:r>
-              <a:rPr sz="2400" spc="-5" dirty="0">
-                <a:cs typeface="Carlito"/>
-              </a:rPr>
-              <a:t>type </a:t>
-            </a:r>
-            <a:r>
-              <a:rPr sz="2400" spc="5" dirty="0">
-                <a:cs typeface="Carlito"/>
-              </a:rPr>
-              <a:t>a </a:t>
-            </a:r>
-            <a:r>
-              <a:rPr lang="en-US" sz="2400" spc="-15" dirty="0">
+              <a:rPr lang="en-US" sz="2400" spc="-5">
+                <a:cs typeface="Carlito"/>
+              </a:rPr>
+              <a:t>give a </a:t>
+            </a:r>
+            <a:r>
+              <a:rPr lang="en-US" sz="2400" spc="-15">
                 <a:cs typeface="Carlito"/>
               </a:rPr>
               <a:t>v</a:t>
             </a:r>
             <a:r>
-              <a:rPr sz="2400" spc="-15" dirty="0">
-                <a:cs typeface="Carlito"/>
-              </a:rPr>
-              <a:t>ariable </a:t>
+              <a:rPr sz="2400" spc="-15">
+                <a:cs typeface="Carlito"/>
+              </a:rPr>
+              <a:t>ariable</a:t>
+            </a:r>
+            <a:r>
+              <a:rPr lang="en-US" sz="2400" spc="-15">
+                <a:cs typeface="Carlito"/>
+              </a:rPr>
+              <a:t> a type</a:t>
+            </a:r>
+            <a:r>
+              <a:rPr sz="2400" spc="-15">
+                <a:cs typeface="Carlito"/>
+              </a:rPr>
+              <a:t> </a:t>
             </a:r>
             <a:r>
               <a:rPr sz="2400" dirty="0">

</xml_diff>